<commit_message>
new MIMOC; Charlie's LD scripts
</commit_message>
<xml_diff>
--- a/notebooks/notebook_pics/workflow_diagrams.pptx
+++ b/notebooks/notebook_pics/workflow_diagrams.pptx
@@ -8,6 +8,7 @@
     <p:sldId id="256" r:id="rId2"/>
     <p:sldId id="257" r:id="rId3"/>
     <p:sldId id="258" r:id="rId4"/>
+    <p:sldId id="259" r:id="rId5"/>
   </p:sldIdLst>
   <p:sldSz cx="12192000" cy="6858000"/>
   <p:notesSz cx="6858000" cy="9144000"/>
@@ -11290,7 +11291,7 @@
           <a:p>
             <a:fld id="{F405A602-02DD-44BF-9C00-5AE797FBCD93}" type="datetimeFigureOut">
               <a:rPr lang="en-US" smtClean="0"/>
-              <a:t>8/22/2017</a:t>
+              <a:t>5/22/2018</a:t>
             </a:fld>
             <a:endParaRPr lang="en-US"/>
           </a:p>
@@ -11460,7 +11461,7 @@
           <a:p>
             <a:fld id="{F405A602-02DD-44BF-9C00-5AE797FBCD93}" type="datetimeFigureOut">
               <a:rPr lang="en-US" smtClean="0"/>
-              <a:t>8/22/2017</a:t>
+              <a:t>5/22/2018</a:t>
             </a:fld>
             <a:endParaRPr lang="en-US"/>
           </a:p>
@@ -11640,7 +11641,7 @@
           <a:p>
             <a:fld id="{F405A602-02DD-44BF-9C00-5AE797FBCD93}" type="datetimeFigureOut">
               <a:rPr lang="en-US" smtClean="0"/>
-              <a:t>8/22/2017</a:t>
+              <a:t>5/22/2018</a:t>
             </a:fld>
             <a:endParaRPr lang="en-US"/>
           </a:p>
@@ -11810,7 +11811,7 @@
           <a:p>
             <a:fld id="{F405A602-02DD-44BF-9C00-5AE797FBCD93}" type="datetimeFigureOut">
               <a:rPr lang="en-US" smtClean="0"/>
-              <a:t>8/22/2017</a:t>
+              <a:t>5/22/2018</a:t>
             </a:fld>
             <a:endParaRPr lang="en-US"/>
           </a:p>
@@ -12056,7 +12057,7 @@
           <a:p>
             <a:fld id="{F405A602-02DD-44BF-9C00-5AE797FBCD93}" type="datetimeFigureOut">
               <a:rPr lang="en-US" smtClean="0"/>
-              <a:t>8/22/2017</a:t>
+              <a:t>5/22/2018</a:t>
             </a:fld>
             <a:endParaRPr lang="en-US"/>
           </a:p>
@@ -12288,7 +12289,7 @@
           <a:p>
             <a:fld id="{F405A602-02DD-44BF-9C00-5AE797FBCD93}" type="datetimeFigureOut">
               <a:rPr lang="en-US" smtClean="0"/>
-              <a:t>8/22/2017</a:t>
+              <a:t>5/22/2018</a:t>
             </a:fld>
             <a:endParaRPr lang="en-US"/>
           </a:p>
@@ -12655,7 +12656,7 @@
           <a:p>
             <a:fld id="{F405A602-02DD-44BF-9C00-5AE797FBCD93}" type="datetimeFigureOut">
               <a:rPr lang="en-US" smtClean="0"/>
-              <a:t>8/22/2017</a:t>
+              <a:t>5/22/2018</a:t>
             </a:fld>
             <a:endParaRPr lang="en-US"/>
           </a:p>
@@ -12773,7 +12774,7 @@
           <a:p>
             <a:fld id="{F405A602-02DD-44BF-9C00-5AE797FBCD93}" type="datetimeFigureOut">
               <a:rPr lang="en-US" smtClean="0"/>
-              <a:t>8/22/2017</a:t>
+              <a:t>5/22/2018</a:t>
             </a:fld>
             <a:endParaRPr lang="en-US"/>
           </a:p>
@@ -12868,7 +12869,7 @@
           <a:p>
             <a:fld id="{F405A602-02DD-44BF-9C00-5AE797FBCD93}" type="datetimeFigureOut">
               <a:rPr lang="en-US" smtClean="0"/>
-              <a:t>8/22/2017</a:t>
+              <a:t>5/22/2018</a:t>
             </a:fld>
             <a:endParaRPr lang="en-US"/>
           </a:p>
@@ -13145,7 +13146,7 @@
           <a:p>
             <a:fld id="{F405A602-02DD-44BF-9C00-5AE797FBCD93}" type="datetimeFigureOut">
               <a:rPr lang="en-US" smtClean="0"/>
-              <a:t>8/22/2017</a:t>
+              <a:t>5/22/2018</a:t>
             </a:fld>
             <a:endParaRPr lang="en-US"/>
           </a:p>
@@ -13398,7 +13399,7 @@
           <a:p>
             <a:fld id="{F405A602-02DD-44BF-9C00-5AE797FBCD93}" type="datetimeFigureOut">
               <a:rPr lang="en-US" smtClean="0"/>
-              <a:t>8/22/2017</a:t>
+              <a:t>5/22/2018</a:t>
             </a:fld>
             <a:endParaRPr lang="en-US"/>
           </a:p>
@@ -13611,7 +13612,7 @@
           <a:p>
             <a:fld id="{F405A602-02DD-44BF-9C00-5AE797FBCD93}" type="datetimeFigureOut">
               <a:rPr lang="en-US" smtClean="0"/>
-              <a:t>8/22/2017</a:t>
+              <a:t>5/22/2018</a:t>
             </a:fld>
             <a:endParaRPr lang="en-US"/>
           </a:p>
@@ -15418,6 +15419,1414 @@
 </p:sld>
 </file>
 
+<file path=ppt/slides/slide4.xml><?xml version="1.0" encoding="utf-8"?>
+<p:sld xmlns:a="http://schemas.openxmlformats.org/drawingml/2006/main" xmlns:r="http://schemas.openxmlformats.org/officeDocument/2006/relationships" xmlns:p="http://schemas.openxmlformats.org/presentationml/2006/main">
+  <p:cSld>
+    <p:spTree>
+      <p:nvGrpSpPr>
+        <p:cNvPr id="1" name=""/>
+        <p:cNvGrpSpPr/>
+        <p:nvPr/>
+      </p:nvGrpSpPr>
+      <p:grpSpPr>
+        <a:xfrm>
+          <a:off x="0" y="0"/>
+          <a:ext cx="0" cy="0"/>
+          <a:chOff x="0" y="0"/>
+          <a:chExt cx="0" cy="0"/>
+        </a:xfrm>
+      </p:grpSpPr>
+      <p:grpSp>
+        <p:nvGrpSpPr>
+          <p:cNvPr id="60" name="Group 59"/>
+          <p:cNvGrpSpPr/>
+          <p:nvPr/>
+        </p:nvGrpSpPr>
+        <p:grpSpPr>
+          <a:xfrm>
+            <a:off x="2015580" y="589280"/>
+            <a:ext cx="5315051" cy="914654"/>
+            <a:chOff x="2015580" y="589280"/>
+            <a:chExt cx="5315051" cy="914654"/>
+          </a:xfrm>
+        </p:grpSpPr>
+        <p:grpSp>
+          <p:nvGrpSpPr>
+            <p:cNvPr id="16" name="Group 15"/>
+            <p:cNvGrpSpPr/>
+            <p:nvPr/>
+          </p:nvGrpSpPr>
+          <p:grpSpPr>
+            <a:xfrm>
+              <a:off x="2015580" y="589280"/>
+              <a:ext cx="3068050" cy="658339"/>
+              <a:chOff x="1080119" y="585616"/>
+              <a:chExt cx="3068050" cy="658339"/>
+            </a:xfrm>
+          </p:grpSpPr>
+          <p:sp>
+            <p:nvSpPr>
+              <p:cNvPr id="27" name="Rounded Rectangle 26"/>
+              <p:cNvSpPr/>
+              <p:nvPr/>
+            </p:nvSpPr>
+            <p:spPr>
+              <a:xfrm>
+                <a:off x="2573720" y="585616"/>
+                <a:ext cx="1383956" cy="650789"/>
+              </a:xfrm>
+              <a:prstGeom prst="roundRect">
+                <a:avLst>
+                  <a:gd name="adj" fmla="val 10338"/>
+                </a:avLst>
+              </a:prstGeom>
+              <a:solidFill>
+                <a:srgbClr val="DA8DF3"/>
+              </a:solidFill>
+              <a:ln>
+                <a:noFill/>
+              </a:ln>
+            </p:spPr>
+            <p:style>
+              <a:lnRef idx="2">
+                <a:schemeClr val="accent1">
+                  <a:shade val="50000"/>
+                </a:schemeClr>
+              </a:lnRef>
+              <a:fillRef idx="1">
+                <a:schemeClr val="accent1"/>
+              </a:fillRef>
+              <a:effectRef idx="0">
+                <a:schemeClr val="accent1"/>
+              </a:effectRef>
+              <a:fontRef idx="minor">
+                <a:schemeClr val="lt1"/>
+              </a:fontRef>
+            </p:style>
+            <p:txBody>
+              <a:bodyPr rtlCol="0" anchor="ctr"/>
+              <a:lstStyle/>
+              <a:p>
+                <a:pPr algn="ctr"/>
+                <a:endParaRPr lang="en-US"/>
+              </a:p>
+            </p:txBody>
+          </p:sp>
+          <p:grpSp>
+            <p:nvGrpSpPr>
+              <p:cNvPr id="12" name="Group 11"/>
+              <p:cNvGrpSpPr/>
+              <p:nvPr/>
+            </p:nvGrpSpPr>
+            <p:grpSpPr>
+              <a:xfrm>
+                <a:off x="1080119" y="587164"/>
+                <a:ext cx="3068050" cy="656791"/>
+                <a:chOff x="1136822" y="469557"/>
+                <a:chExt cx="3068050" cy="656791"/>
+              </a:xfrm>
+            </p:grpSpPr>
+            <p:sp>
+              <p:nvSpPr>
+                <p:cNvPr id="2" name="Rounded Rectangle 1"/>
+                <p:cNvSpPr/>
+                <p:nvPr/>
+              </p:nvSpPr>
+              <p:spPr>
+                <a:xfrm>
+                  <a:off x="1136822" y="469557"/>
+                  <a:ext cx="1383956" cy="650789"/>
+                </a:xfrm>
+                <a:prstGeom prst="roundRect">
+                  <a:avLst>
+                    <a:gd name="adj" fmla="val 10338"/>
+                  </a:avLst>
+                </a:prstGeom>
+                <a:solidFill>
+                  <a:srgbClr val="9966FF"/>
+                </a:solidFill>
+                <a:ln>
+                  <a:noFill/>
+                </a:ln>
+              </p:spPr>
+              <p:style>
+                <a:lnRef idx="2">
+                  <a:schemeClr val="accent1">
+                    <a:shade val="50000"/>
+                  </a:schemeClr>
+                </a:lnRef>
+                <a:fillRef idx="1">
+                  <a:schemeClr val="accent1"/>
+                </a:fillRef>
+                <a:effectRef idx="0">
+                  <a:schemeClr val="accent1"/>
+                </a:effectRef>
+                <a:fontRef idx="minor">
+                  <a:schemeClr val="lt1"/>
+                </a:fontRef>
+              </p:style>
+              <p:txBody>
+                <a:bodyPr rtlCol="0" anchor="ctr"/>
+                <a:lstStyle/>
+                <a:p>
+                  <a:pPr algn="ctr"/>
+                  <a:endParaRPr lang="en-US"/>
+                </a:p>
+              </p:txBody>
+            </p:sp>
+            <p:sp>
+              <p:nvSpPr>
+                <p:cNvPr id="11" name="TextBox 10"/>
+                <p:cNvSpPr txBox="1"/>
+                <p:nvPr/>
+              </p:nvSpPr>
+              <p:spPr>
+                <a:xfrm>
+                  <a:off x="1246467" y="610284"/>
+                  <a:ext cx="1257226" cy="369332"/>
+                </a:xfrm>
+                <a:prstGeom prst="rect">
+                  <a:avLst/>
+                </a:prstGeom>
+                <a:noFill/>
+              </p:spPr>
+              <p:txBody>
+                <a:bodyPr wrap="square" rtlCol="0">
+                  <a:spAutoFit/>
+                </a:bodyPr>
+                <a:lstStyle/>
+                <a:p>
+                  <a:r>
+                    <a:rPr lang="en-US" dirty="0" smtClean="0">
+                      <a:solidFill>
+                        <a:schemeClr val="bg1"/>
+                      </a:solidFill>
+                    </a:rPr>
+                    <a:t>RAW DATA</a:t>
+                  </a:r>
+                  <a:endParaRPr lang="en-US" dirty="0">
+                    <a:solidFill>
+                      <a:schemeClr val="bg1"/>
+                    </a:solidFill>
+                  </a:endParaRPr>
+                </a:p>
+              </p:txBody>
+            </p:sp>
+            <p:sp>
+              <p:nvSpPr>
+                <p:cNvPr id="30" name="TextBox 29"/>
+                <p:cNvSpPr txBox="1"/>
+                <p:nvPr/>
+              </p:nvSpPr>
+              <p:spPr>
+                <a:xfrm>
+                  <a:off x="2619090" y="480017"/>
+                  <a:ext cx="1585782" cy="646331"/>
+                </a:xfrm>
+                <a:prstGeom prst="rect">
+                  <a:avLst/>
+                </a:prstGeom>
+                <a:noFill/>
+              </p:spPr>
+              <p:txBody>
+                <a:bodyPr wrap="square" rtlCol="0">
+                  <a:spAutoFit/>
+                </a:bodyPr>
+                <a:lstStyle/>
+                <a:p>
+                  <a:r>
+                    <a:rPr lang="en-US" dirty="0" err="1" smtClean="0">
+                      <a:solidFill>
+                        <a:schemeClr val="bg1"/>
+                      </a:solidFill>
+                    </a:rPr>
+                    <a:t>Demultiplex</a:t>
+                  </a:r>
+                  <a:r>
+                    <a:rPr lang="en-US" dirty="0" smtClean="0">
+                      <a:solidFill>
+                        <a:schemeClr val="bg1"/>
+                      </a:solidFill>
+                    </a:rPr>
+                    <a:t> and filter</a:t>
+                  </a:r>
+                  <a:endParaRPr lang="en-US" dirty="0">
+                    <a:solidFill>
+                      <a:schemeClr val="bg1"/>
+                    </a:solidFill>
+                  </a:endParaRPr>
+                </a:p>
+              </p:txBody>
+            </p:sp>
+            <p:sp>
+              <p:nvSpPr>
+                <p:cNvPr id="31" name="Flowchart: Extract 30"/>
+                <p:cNvSpPr/>
+                <p:nvPr/>
+              </p:nvSpPr>
+              <p:spPr>
+                <a:xfrm rot="5400000">
+                  <a:off x="2466970" y="675873"/>
+                  <a:ext cx="276209" cy="235062"/>
+                </a:xfrm>
+                <a:prstGeom prst="flowChartExtract">
+                  <a:avLst/>
+                </a:prstGeom>
+                <a:ln>
+                  <a:solidFill>
+                    <a:srgbClr val="6600CC"/>
+                  </a:solidFill>
+                </a:ln>
+              </p:spPr>
+              <p:style>
+                <a:lnRef idx="2">
+                  <a:schemeClr val="accent5">
+                    <a:hueOff val="0"/>
+                    <a:satOff val="0"/>
+                    <a:lumOff val="0"/>
+                    <a:alphaOff val="0"/>
+                  </a:schemeClr>
+                </a:lnRef>
+                <a:fillRef idx="1">
+                  <a:schemeClr val="lt1">
+                    <a:hueOff val="0"/>
+                    <a:satOff val="0"/>
+                    <a:lumOff val="0"/>
+                    <a:alphaOff val="0"/>
+                  </a:schemeClr>
+                </a:fillRef>
+                <a:effectRef idx="0">
+                  <a:schemeClr val="lt1">
+                    <a:hueOff val="0"/>
+                    <a:satOff val="0"/>
+                    <a:lumOff val="0"/>
+                    <a:alphaOff val="0"/>
+                  </a:schemeClr>
+                </a:effectRef>
+                <a:fontRef idx="minor">
+                  <a:schemeClr val="dk1">
+                    <a:hueOff val="0"/>
+                    <a:satOff val="0"/>
+                    <a:lumOff val="0"/>
+                    <a:alphaOff val="0"/>
+                  </a:schemeClr>
+                </a:fontRef>
+              </p:style>
+            </p:sp>
+          </p:grpSp>
+        </p:grpSp>
+        <p:sp>
+          <p:nvSpPr>
+            <p:cNvPr id="18" name="Rectangle 17"/>
+            <p:cNvSpPr/>
+            <p:nvPr/>
+          </p:nvSpPr>
+          <p:spPr>
+            <a:xfrm>
+              <a:off x="4854550" y="783452"/>
+              <a:ext cx="2358602" cy="211511"/>
+            </a:xfrm>
+            <a:prstGeom prst="rect">
+              <a:avLst/>
+            </a:prstGeom>
+            <a:solidFill>
+              <a:schemeClr val="bg1"/>
+            </a:solidFill>
+            <a:ln>
+              <a:solidFill>
+                <a:srgbClr val="6600CC"/>
+              </a:solidFill>
+            </a:ln>
+          </p:spPr>
+          <p:style>
+            <a:lnRef idx="2">
+              <a:schemeClr val="accent1">
+                <a:shade val="50000"/>
+              </a:schemeClr>
+            </a:lnRef>
+            <a:fillRef idx="1">
+              <a:schemeClr val="accent1"/>
+            </a:fillRef>
+            <a:effectRef idx="0">
+              <a:schemeClr val="accent1"/>
+            </a:effectRef>
+            <a:fontRef idx="minor">
+              <a:schemeClr val="lt1"/>
+            </a:fontRef>
+          </p:style>
+          <p:txBody>
+            <a:bodyPr rtlCol="0" anchor="ctr"/>
+            <a:lstStyle/>
+            <a:p>
+              <a:pPr algn="ctr"/>
+              <a:endParaRPr lang="en-US"/>
+            </a:p>
+          </p:txBody>
+        </p:sp>
+        <p:sp>
+          <p:nvSpPr>
+            <p:cNvPr id="43" name="Down Arrow 42"/>
+            <p:cNvSpPr/>
+            <p:nvPr/>
+          </p:nvSpPr>
+          <p:spPr>
+            <a:xfrm>
+              <a:off x="6918739" y="783452"/>
+              <a:ext cx="411892" cy="720482"/>
+            </a:xfrm>
+            <a:prstGeom prst="downArrow">
+              <a:avLst/>
+            </a:prstGeom>
+            <a:solidFill>
+              <a:schemeClr val="bg1"/>
+            </a:solidFill>
+            <a:ln>
+              <a:solidFill>
+                <a:srgbClr val="6600CC"/>
+              </a:solidFill>
+            </a:ln>
+          </p:spPr>
+          <p:style>
+            <a:lnRef idx="2">
+              <a:schemeClr val="accent1">
+                <a:shade val="50000"/>
+              </a:schemeClr>
+            </a:lnRef>
+            <a:fillRef idx="1">
+              <a:schemeClr val="accent1"/>
+            </a:fillRef>
+            <a:effectRef idx="0">
+              <a:schemeClr val="accent1"/>
+            </a:effectRef>
+            <a:fontRef idx="minor">
+              <a:schemeClr val="lt1"/>
+            </a:fontRef>
+          </p:style>
+          <p:txBody>
+            <a:bodyPr rtlCol="0" anchor="ctr"/>
+            <a:lstStyle/>
+            <a:p>
+              <a:pPr algn="ctr"/>
+              <a:endParaRPr lang="en-US"/>
+            </a:p>
+          </p:txBody>
+        </p:sp>
+      </p:grpSp>
+      <p:grpSp>
+        <p:nvGrpSpPr>
+          <p:cNvPr id="59" name="Group 58"/>
+          <p:cNvGrpSpPr/>
+          <p:nvPr/>
+        </p:nvGrpSpPr>
+        <p:grpSpPr>
+          <a:xfrm>
+            <a:off x="4772650" y="1437655"/>
+            <a:ext cx="6708412" cy="1242060"/>
+            <a:chOff x="4772650" y="1437655"/>
+            <a:chExt cx="6708412" cy="1242060"/>
+          </a:xfrm>
+        </p:grpSpPr>
+        <p:grpSp>
+          <p:nvGrpSpPr>
+            <p:cNvPr id="51" name="Group 50"/>
+            <p:cNvGrpSpPr/>
+            <p:nvPr/>
+          </p:nvGrpSpPr>
+          <p:grpSpPr>
+            <a:xfrm>
+              <a:off x="6449753" y="1459163"/>
+              <a:ext cx="3354206" cy="947258"/>
+              <a:chOff x="5758695" y="1721167"/>
+              <a:chExt cx="3354206" cy="947258"/>
+            </a:xfrm>
+          </p:grpSpPr>
+          <p:sp>
+            <p:nvSpPr>
+              <p:cNvPr id="47" name="Rounded Rectangle 46"/>
+              <p:cNvSpPr/>
+              <p:nvPr/>
+            </p:nvSpPr>
+            <p:spPr>
+              <a:xfrm>
+                <a:off x="7435798" y="1721167"/>
+                <a:ext cx="1568697" cy="943552"/>
+              </a:xfrm>
+              <a:prstGeom prst="roundRect">
+                <a:avLst>
+                  <a:gd name="adj" fmla="val 10338"/>
+                </a:avLst>
+              </a:prstGeom>
+              <a:solidFill>
+                <a:srgbClr val="45B451"/>
+              </a:solidFill>
+              <a:ln>
+                <a:noFill/>
+              </a:ln>
+            </p:spPr>
+            <p:style>
+              <a:lnRef idx="2">
+                <a:schemeClr val="accent1">
+                  <a:shade val="50000"/>
+                </a:schemeClr>
+              </a:lnRef>
+              <a:fillRef idx="1">
+                <a:schemeClr val="accent1"/>
+              </a:fillRef>
+              <a:effectRef idx="0">
+                <a:schemeClr val="accent1"/>
+              </a:effectRef>
+              <a:fontRef idx="minor">
+                <a:schemeClr val="lt1"/>
+              </a:fontRef>
+            </p:style>
+            <p:txBody>
+              <a:bodyPr rtlCol="0" anchor="ctr"/>
+              <a:lstStyle/>
+              <a:p>
+                <a:pPr algn="ctr"/>
+                <a:endParaRPr lang="en-US"/>
+              </a:p>
+            </p:txBody>
+          </p:sp>
+          <p:grpSp>
+            <p:nvGrpSpPr>
+              <p:cNvPr id="50" name="Group 49"/>
+              <p:cNvGrpSpPr/>
+              <p:nvPr/>
+            </p:nvGrpSpPr>
+            <p:grpSpPr>
+              <a:xfrm>
+                <a:off x="5758695" y="1721167"/>
+                <a:ext cx="3354206" cy="947258"/>
+                <a:chOff x="5763185" y="1441725"/>
+                <a:chExt cx="3354206" cy="947258"/>
+              </a:xfrm>
+            </p:grpSpPr>
+            <p:sp>
+              <p:nvSpPr>
+                <p:cNvPr id="45" name="Rounded Rectangle 44"/>
+                <p:cNvSpPr/>
+                <p:nvPr/>
+              </p:nvSpPr>
+              <p:spPr>
+                <a:xfrm>
+                  <a:off x="5763185" y="1441725"/>
+                  <a:ext cx="1568697" cy="943552"/>
+                </a:xfrm>
+                <a:prstGeom prst="roundRect">
+                  <a:avLst>
+                    <a:gd name="adj" fmla="val 10338"/>
+                  </a:avLst>
+                </a:prstGeom>
+                <a:solidFill>
+                  <a:srgbClr val="92D050"/>
+                </a:solidFill>
+                <a:ln>
+                  <a:noFill/>
+                </a:ln>
+              </p:spPr>
+              <p:style>
+                <a:lnRef idx="2">
+                  <a:schemeClr val="accent1">
+                    <a:shade val="50000"/>
+                  </a:schemeClr>
+                </a:lnRef>
+                <a:fillRef idx="1">
+                  <a:schemeClr val="accent1"/>
+                </a:fillRef>
+                <a:effectRef idx="0">
+                  <a:schemeClr val="accent1"/>
+                </a:effectRef>
+                <a:fontRef idx="minor">
+                  <a:schemeClr val="lt1"/>
+                </a:fontRef>
+              </p:style>
+              <p:txBody>
+                <a:bodyPr rtlCol="0" anchor="ctr"/>
+                <a:lstStyle/>
+                <a:p>
+                  <a:pPr algn="ctr"/>
+                  <a:endParaRPr lang="en-US"/>
+                </a:p>
+              </p:txBody>
+            </p:sp>
+            <p:sp>
+              <p:nvSpPr>
+                <p:cNvPr id="46" name="TextBox 45"/>
+                <p:cNvSpPr txBox="1"/>
+                <p:nvPr/>
+              </p:nvSpPr>
+              <p:spPr>
+                <a:xfrm>
+                  <a:off x="5858996" y="1465653"/>
+                  <a:ext cx="1585782" cy="923330"/>
+                </a:xfrm>
+                <a:prstGeom prst="rect">
+                  <a:avLst/>
+                </a:prstGeom>
+                <a:noFill/>
+              </p:spPr>
+              <p:txBody>
+                <a:bodyPr wrap="square" rtlCol="0">
+                  <a:spAutoFit/>
+                </a:bodyPr>
+                <a:lstStyle/>
+                <a:p>
+                  <a:r>
+                    <a:rPr lang="en-US" dirty="0" smtClean="0">
+                      <a:solidFill>
+                        <a:schemeClr val="bg1"/>
+                      </a:solidFill>
+                    </a:rPr>
+                    <a:t>Align individuals to reference</a:t>
+                  </a:r>
+                  <a:endParaRPr lang="en-US" dirty="0">
+                    <a:solidFill>
+                      <a:schemeClr val="bg1"/>
+                    </a:solidFill>
+                  </a:endParaRPr>
+                </a:p>
+              </p:txBody>
+            </p:sp>
+            <p:sp>
+              <p:nvSpPr>
+                <p:cNvPr id="48" name="TextBox 47"/>
+                <p:cNvSpPr txBox="1"/>
+                <p:nvPr/>
+              </p:nvSpPr>
+              <p:spPr>
+                <a:xfrm>
+                  <a:off x="7531609" y="1461947"/>
+                  <a:ext cx="1585782" cy="923330"/>
+                </a:xfrm>
+                <a:prstGeom prst="rect">
+                  <a:avLst/>
+                </a:prstGeom>
+                <a:noFill/>
+              </p:spPr>
+              <p:txBody>
+                <a:bodyPr wrap="square" rtlCol="0">
+                  <a:spAutoFit/>
+                </a:bodyPr>
+                <a:lstStyle/>
+                <a:p>
+                  <a:r>
+                    <a:rPr lang="en-US" dirty="0" smtClean="0">
+                      <a:solidFill>
+                        <a:schemeClr val="bg1"/>
+                      </a:solidFill>
+                    </a:rPr>
+                    <a:t>Identify SNPs and call genotypes</a:t>
+                  </a:r>
+                  <a:endParaRPr lang="en-US" dirty="0">
+                    <a:solidFill>
+                      <a:schemeClr val="bg1"/>
+                    </a:solidFill>
+                  </a:endParaRPr>
+                </a:p>
+              </p:txBody>
+            </p:sp>
+            <p:sp>
+              <p:nvSpPr>
+                <p:cNvPr id="49" name="Flowchart: Extract 48"/>
+                <p:cNvSpPr/>
+                <p:nvPr/>
+              </p:nvSpPr>
+              <p:spPr>
+                <a:xfrm rot="5400000">
+                  <a:off x="7275973" y="1640791"/>
+                  <a:ext cx="276209" cy="235062"/>
+                </a:xfrm>
+                <a:prstGeom prst="flowChartExtract">
+                  <a:avLst/>
+                </a:prstGeom>
+                <a:ln>
+                  <a:solidFill>
+                    <a:schemeClr val="accent6">
+                      <a:lumMod val="50000"/>
+                    </a:schemeClr>
+                  </a:solidFill>
+                </a:ln>
+              </p:spPr>
+              <p:style>
+                <a:lnRef idx="2">
+                  <a:schemeClr val="accent5">
+                    <a:hueOff val="0"/>
+                    <a:satOff val="0"/>
+                    <a:lumOff val="0"/>
+                    <a:alphaOff val="0"/>
+                  </a:schemeClr>
+                </a:lnRef>
+                <a:fillRef idx="1">
+                  <a:schemeClr val="lt1">
+                    <a:hueOff val="0"/>
+                    <a:satOff val="0"/>
+                    <a:lumOff val="0"/>
+                    <a:alphaOff val="0"/>
+                  </a:schemeClr>
+                </a:fillRef>
+                <a:effectRef idx="0">
+                  <a:schemeClr val="lt1">
+                    <a:hueOff val="0"/>
+                    <a:satOff val="0"/>
+                    <a:lumOff val="0"/>
+                    <a:alphaOff val="0"/>
+                  </a:schemeClr>
+                </a:effectRef>
+                <a:fontRef idx="minor">
+                  <a:schemeClr val="dk1">
+                    <a:hueOff val="0"/>
+                    <a:satOff val="0"/>
+                    <a:lumOff val="0"/>
+                    <a:alphaOff val="0"/>
+                  </a:schemeClr>
+                </a:fontRef>
+              </p:style>
+            </p:sp>
+          </p:grpSp>
+        </p:grpSp>
+        <p:grpSp>
+          <p:nvGrpSpPr>
+            <p:cNvPr id="52" name="Group 51"/>
+            <p:cNvGrpSpPr/>
+            <p:nvPr/>
+          </p:nvGrpSpPr>
+          <p:grpSpPr>
+            <a:xfrm>
+              <a:off x="4772650" y="1437655"/>
+              <a:ext cx="1758137" cy="969032"/>
+              <a:chOff x="4064507" y="1419941"/>
+              <a:chExt cx="1758137" cy="969032"/>
+            </a:xfrm>
+          </p:grpSpPr>
+          <p:grpSp>
+            <p:nvGrpSpPr>
+              <p:cNvPr id="17" name="Group 16"/>
+              <p:cNvGrpSpPr/>
+              <p:nvPr/>
+            </p:nvGrpSpPr>
+            <p:grpSpPr>
+              <a:xfrm>
+                <a:off x="4064507" y="1419941"/>
+                <a:ext cx="1585782" cy="969032"/>
+                <a:chOff x="4064507" y="1419941"/>
+                <a:chExt cx="1585782" cy="969032"/>
+              </a:xfrm>
+            </p:grpSpPr>
+            <p:sp>
+              <p:nvSpPr>
+                <p:cNvPr id="41" name="Rounded Rectangle 40"/>
+                <p:cNvSpPr/>
+                <p:nvPr/>
+              </p:nvSpPr>
+              <p:spPr>
+                <a:xfrm>
+                  <a:off x="4064507" y="1445421"/>
+                  <a:ext cx="1568697" cy="943552"/>
+                </a:xfrm>
+                <a:prstGeom prst="roundRect">
+                  <a:avLst>
+                    <a:gd name="adj" fmla="val 10338"/>
+                  </a:avLst>
+                </a:prstGeom>
+                <a:solidFill>
+                  <a:srgbClr val="6AC6C2"/>
+                </a:solidFill>
+                <a:ln>
+                  <a:noFill/>
+                </a:ln>
+              </p:spPr>
+              <p:style>
+                <a:lnRef idx="2">
+                  <a:schemeClr val="accent1">
+                    <a:shade val="50000"/>
+                  </a:schemeClr>
+                </a:lnRef>
+                <a:fillRef idx="1">
+                  <a:schemeClr val="accent1"/>
+                </a:fillRef>
+                <a:effectRef idx="0">
+                  <a:schemeClr val="accent1"/>
+                </a:effectRef>
+                <a:fontRef idx="minor">
+                  <a:schemeClr val="lt1"/>
+                </a:fontRef>
+              </p:style>
+              <p:txBody>
+                <a:bodyPr rtlCol="0" anchor="ctr"/>
+                <a:lstStyle/>
+                <a:p>
+                  <a:pPr algn="ctr"/>
+                  <a:endParaRPr lang="en-US"/>
+                </a:p>
+              </p:txBody>
+            </p:sp>
+            <p:sp>
+              <p:nvSpPr>
+                <p:cNvPr id="42" name="TextBox 41"/>
+                <p:cNvSpPr txBox="1"/>
+                <p:nvPr/>
+              </p:nvSpPr>
+              <p:spPr>
+                <a:xfrm>
+                  <a:off x="4064507" y="1419941"/>
+                  <a:ext cx="1585782" cy="923330"/>
+                </a:xfrm>
+                <a:prstGeom prst="rect">
+                  <a:avLst/>
+                </a:prstGeom>
+                <a:noFill/>
+              </p:spPr>
+              <p:txBody>
+                <a:bodyPr wrap="square" rtlCol="0">
+                  <a:spAutoFit/>
+                </a:bodyPr>
+                <a:lstStyle/>
+                <a:p>
+                  <a:r>
+                    <a:rPr lang="en-US" dirty="0" smtClean="0">
+                      <a:solidFill>
+                        <a:schemeClr val="bg1"/>
+                      </a:solidFill>
+                    </a:rPr>
+                    <a:t>Build a </a:t>
+                  </a:r>
+                  <a:r>
+                    <a:rPr lang="en-US" i="1" dirty="0" smtClean="0">
+                      <a:solidFill>
+                        <a:schemeClr val="bg1"/>
+                      </a:solidFill>
+                    </a:rPr>
+                    <a:t>de novo </a:t>
+                  </a:r>
+                  <a:r>
+                    <a:rPr lang="en-US" dirty="0" smtClean="0">
+                      <a:solidFill>
+                        <a:schemeClr val="bg1"/>
+                      </a:solidFill>
+                    </a:rPr>
+                    <a:t>reference “genome”</a:t>
+                  </a:r>
+                  <a:endParaRPr lang="en-US" dirty="0">
+                    <a:solidFill>
+                      <a:schemeClr val="bg1"/>
+                    </a:solidFill>
+                  </a:endParaRPr>
+                </a:p>
+              </p:txBody>
+            </p:sp>
+          </p:grpSp>
+          <p:sp>
+            <p:nvSpPr>
+              <p:cNvPr id="44" name="Flowchart: Extract 43"/>
+              <p:cNvSpPr/>
+              <p:nvPr/>
+            </p:nvSpPr>
+            <p:spPr>
+              <a:xfrm rot="5400000">
+                <a:off x="5567008" y="1637682"/>
+                <a:ext cx="276209" cy="235062"/>
+              </a:xfrm>
+              <a:prstGeom prst="flowChartExtract">
+                <a:avLst/>
+              </a:prstGeom>
+              <a:ln>
+                <a:solidFill>
+                  <a:srgbClr val="516C3F"/>
+                </a:solidFill>
+              </a:ln>
+            </p:spPr>
+            <p:style>
+              <a:lnRef idx="2">
+                <a:schemeClr val="accent5">
+                  <a:hueOff val="0"/>
+                  <a:satOff val="0"/>
+                  <a:lumOff val="0"/>
+                  <a:alphaOff val="0"/>
+                </a:schemeClr>
+              </a:lnRef>
+              <a:fillRef idx="1">
+                <a:schemeClr val="lt1">
+                  <a:hueOff val="0"/>
+                  <a:satOff val="0"/>
+                  <a:lumOff val="0"/>
+                  <a:alphaOff val="0"/>
+                </a:schemeClr>
+              </a:fillRef>
+              <a:effectRef idx="0">
+                <a:schemeClr val="lt1">
+                  <a:hueOff val="0"/>
+                  <a:satOff val="0"/>
+                  <a:lumOff val="0"/>
+                  <a:alphaOff val="0"/>
+                </a:schemeClr>
+              </a:effectRef>
+              <a:fontRef idx="minor">
+                <a:schemeClr val="dk1">
+                  <a:hueOff val="0"/>
+                  <a:satOff val="0"/>
+                  <a:lumOff val="0"/>
+                  <a:alphaOff val="0"/>
+                </a:schemeClr>
+              </a:fontRef>
+            </p:style>
+          </p:sp>
+        </p:grpSp>
+        <p:grpSp>
+          <p:nvGrpSpPr>
+            <p:cNvPr id="58" name="Group 57"/>
+            <p:cNvGrpSpPr/>
+            <p:nvPr/>
+          </p:nvGrpSpPr>
+          <p:grpSpPr>
+            <a:xfrm>
+              <a:off x="9803959" y="1459163"/>
+              <a:ext cx="1677103" cy="1220552"/>
+              <a:chOff x="10360563" y="1434232"/>
+              <a:chExt cx="1677103" cy="1220552"/>
+            </a:xfrm>
+          </p:grpSpPr>
+          <p:sp>
+            <p:nvSpPr>
+              <p:cNvPr id="55" name="Rounded Rectangle 54"/>
+              <p:cNvSpPr/>
+              <p:nvPr/>
+            </p:nvSpPr>
+            <p:spPr>
+              <a:xfrm>
+                <a:off x="10360563" y="1434232"/>
+                <a:ext cx="1568697" cy="1197849"/>
+              </a:xfrm>
+              <a:prstGeom prst="roundRect">
+                <a:avLst>
+                  <a:gd name="adj" fmla="val 10338"/>
+                </a:avLst>
+              </a:prstGeom>
+              <a:solidFill>
+                <a:schemeClr val="accent6">
+                  <a:lumMod val="75000"/>
+                </a:schemeClr>
+              </a:solidFill>
+              <a:ln>
+                <a:noFill/>
+              </a:ln>
+            </p:spPr>
+            <p:style>
+              <a:lnRef idx="2">
+                <a:schemeClr val="accent1">
+                  <a:shade val="50000"/>
+                </a:schemeClr>
+              </a:lnRef>
+              <a:fillRef idx="1">
+                <a:schemeClr val="accent1"/>
+              </a:fillRef>
+              <a:effectRef idx="0">
+                <a:schemeClr val="accent1"/>
+              </a:effectRef>
+              <a:fontRef idx="minor">
+                <a:schemeClr val="lt1"/>
+              </a:fontRef>
+            </p:style>
+            <p:txBody>
+              <a:bodyPr rtlCol="0" anchor="ctr"/>
+              <a:lstStyle/>
+              <a:p>
+                <a:pPr algn="ctr"/>
+                <a:endParaRPr lang="en-US"/>
+              </a:p>
+            </p:txBody>
+          </p:sp>
+          <p:sp>
+            <p:nvSpPr>
+              <p:cNvPr id="56" name="TextBox 55"/>
+              <p:cNvSpPr txBox="1"/>
+              <p:nvPr/>
+            </p:nvSpPr>
+            <p:spPr>
+              <a:xfrm>
+                <a:off x="10451884" y="1454455"/>
+                <a:ext cx="1585782" cy="1200329"/>
+              </a:xfrm>
+              <a:prstGeom prst="rect">
+                <a:avLst/>
+              </a:prstGeom>
+              <a:noFill/>
+            </p:spPr>
+            <p:txBody>
+              <a:bodyPr wrap="square" rtlCol="0">
+                <a:spAutoFit/>
+              </a:bodyPr>
+              <a:lstStyle/>
+              <a:p>
+                <a:r>
+                  <a:rPr lang="en-US" dirty="0" smtClean="0">
+                    <a:solidFill>
+                      <a:schemeClr val="bg1"/>
+                    </a:solidFill>
+                  </a:rPr>
+                  <a:t>Align final set of loci to the Atlantic cod genome</a:t>
+                </a:r>
+                <a:endParaRPr lang="en-US" dirty="0">
+                  <a:solidFill>
+                    <a:schemeClr val="bg1"/>
+                  </a:solidFill>
+                </a:endParaRPr>
+              </a:p>
+            </p:txBody>
+          </p:sp>
+        </p:grpSp>
+        <p:sp>
+          <p:nvSpPr>
+            <p:cNvPr id="57" name="Flowchart: Extract 56"/>
+            <p:cNvSpPr/>
+            <p:nvPr/>
+          </p:nvSpPr>
+          <p:spPr>
+            <a:xfrm rot="5400000">
+              <a:off x="9611448" y="1655396"/>
+              <a:ext cx="276209" cy="235062"/>
+            </a:xfrm>
+            <a:prstGeom prst="flowChartExtract">
+              <a:avLst/>
+            </a:prstGeom>
+            <a:ln>
+              <a:solidFill>
+                <a:schemeClr val="accent6">
+                  <a:lumMod val="50000"/>
+                </a:schemeClr>
+              </a:solidFill>
+            </a:ln>
+          </p:spPr>
+          <p:style>
+            <a:lnRef idx="2">
+              <a:schemeClr val="accent5">
+                <a:hueOff val="0"/>
+                <a:satOff val="0"/>
+                <a:lumOff val="0"/>
+                <a:alphaOff val="0"/>
+              </a:schemeClr>
+            </a:lnRef>
+            <a:fillRef idx="1">
+              <a:schemeClr val="lt1">
+                <a:hueOff val="0"/>
+                <a:satOff val="0"/>
+                <a:lumOff val="0"/>
+                <a:alphaOff val="0"/>
+              </a:schemeClr>
+            </a:fillRef>
+            <a:effectRef idx="0">
+              <a:schemeClr val="lt1">
+                <a:hueOff val="0"/>
+                <a:satOff val="0"/>
+                <a:lumOff val="0"/>
+                <a:alphaOff val="0"/>
+              </a:schemeClr>
+            </a:effectRef>
+            <a:fontRef idx="minor">
+              <a:schemeClr val="dk1">
+                <a:hueOff val="0"/>
+                <a:satOff val="0"/>
+                <a:lumOff val="0"/>
+                <a:alphaOff val="0"/>
+              </a:schemeClr>
+            </a:fontRef>
+          </p:style>
+        </p:sp>
+      </p:grpSp>
+      <p:grpSp>
+        <p:nvGrpSpPr>
+          <p:cNvPr id="61" name="Group 60"/>
+          <p:cNvGrpSpPr/>
+          <p:nvPr/>
+        </p:nvGrpSpPr>
+        <p:grpSpPr>
+          <a:xfrm>
+            <a:off x="2015580" y="2344067"/>
+            <a:ext cx="3632966" cy="950029"/>
+            <a:chOff x="2015580" y="2344067"/>
+            <a:chExt cx="3632966" cy="950029"/>
+          </a:xfrm>
+        </p:grpSpPr>
+        <p:grpSp>
+          <p:nvGrpSpPr>
+            <p:cNvPr id="32" name="Group 31"/>
+            <p:cNvGrpSpPr/>
+            <p:nvPr/>
+          </p:nvGrpSpPr>
+          <p:grpSpPr>
+            <a:xfrm>
+              <a:off x="2015580" y="2632082"/>
+              <a:ext cx="3024562" cy="662014"/>
+              <a:chOff x="1080119" y="575939"/>
+              <a:chExt cx="3024562" cy="662014"/>
+            </a:xfrm>
+          </p:grpSpPr>
+          <p:sp>
+            <p:nvSpPr>
+              <p:cNvPr id="33" name="Rounded Rectangle 32"/>
+              <p:cNvSpPr/>
+              <p:nvPr/>
+            </p:nvSpPr>
+            <p:spPr>
+              <a:xfrm>
+                <a:off x="2573720" y="585616"/>
+                <a:ext cx="1383956" cy="650789"/>
+              </a:xfrm>
+              <a:prstGeom prst="roundRect">
+                <a:avLst>
+                  <a:gd name="adj" fmla="val 10338"/>
+                </a:avLst>
+              </a:prstGeom>
+              <a:solidFill>
+                <a:schemeClr val="accent1">
+                  <a:lumMod val="60000"/>
+                  <a:lumOff val="40000"/>
+                </a:schemeClr>
+              </a:solidFill>
+              <a:ln>
+                <a:noFill/>
+              </a:ln>
+            </p:spPr>
+            <p:style>
+              <a:lnRef idx="2">
+                <a:schemeClr val="accent1">
+                  <a:shade val="50000"/>
+                </a:schemeClr>
+              </a:lnRef>
+              <a:fillRef idx="1">
+                <a:schemeClr val="accent1"/>
+              </a:fillRef>
+              <a:effectRef idx="0">
+                <a:schemeClr val="accent1"/>
+              </a:effectRef>
+              <a:fontRef idx="minor">
+                <a:schemeClr val="lt1"/>
+              </a:fontRef>
+            </p:style>
+            <p:txBody>
+              <a:bodyPr rtlCol="0" anchor="ctr"/>
+              <a:lstStyle/>
+              <a:p>
+                <a:pPr algn="ctr"/>
+                <a:endParaRPr lang="en-US"/>
+              </a:p>
+            </p:txBody>
+          </p:sp>
+          <p:grpSp>
+            <p:nvGrpSpPr>
+              <p:cNvPr id="34" name="Group 33"/>
+              <p:cNvGrpSpPr/>
+              <p:nvPr/>
+            </p:nvGrpSpPr>
+            <p:grpSpPr>
+              <a:xfrm>
+                <a:off x="1080119" y="575939"/>
+                <a:ext cx="3024562" cy="662014"/>
+                <a:chOff x="1136822" y="458332"/>
+                <a:chExt cx="3024562" cy="662014"/>
+              </a:xfrm>
+            </p:grpSpPr>
+            <p:sp>
+              <p:nvSpPr>
+                <p:cNvPr id="35" name="Rounded Rectangle 34"/>
+                <p:cNvSpPr/>
+                <p:nvPr/>
+              </p:nvSpPr>
+              <p:spPr>
+                <a:xfrm>
+                  <a:off x="1136822" y="469557"/>
+                  <a:ext cx="1383956" cy="650789"/>
+                </a:xfrm>
+                <a:prstGeom prst="roundRect">
+                  <a:avLst>
+                    <a:gd name="adj" fmla="val 10338"/>
+                  </a:avLst>
+                </a:prstGeom>
+                <a:solidFill>
+                  <a:srgbClr val="4472C4"/>
+                </a:solidFill>
+                <a:ln>
+                  <a:noFill/>
+                </a:ln>
+              </p:spPr>
+              <p:style>
+                <a:lnRef idx="2">
+                  <a:schemeClr val="accent1">
+                    <a:shade val="50000"/>
+                  </a:schemeClr>
+                </a:lnRef>
+                <a:fillRef idx="1">
+                  <a:schemeClr val="accent1"/>
+                </a:fillRef>
+                <a:effectRef idx="0">
+                  <a:schemeClr val="accent1"/>
+                </a:effectRef>
+                <a:fontRef idx="minor">
+                  <a:schemeClr val="lt1"/>
+                </a:fontRef>
+              </p:style>
+              <p:txBody>
+                <a:bodyPr rtlCol="0" anchor="ctr"/>
+                <a:lstStyle/>
+                <a:p>
+                  <a:pPr algn="ctr"/>
+                  <a:endParaRPr lang="en-US"/>
+                </a:p>
+              </p:txBody>
+            </p:sp>
+            <p:sp>
+              <p:nvSpPr>
+                <p:cNvPr id="36" name="TextBox 35"/>
+                <p:cNvSpPr txBox="1"/>
+                <p:nvPr/>
+              </p:nvSpPr>
+              <p:spPr>
+                <a:xfrm>
+                  <a:off x="1246467" y="610284"/>
+                  <a:ext cx="1257226" cy="369332"/>
+                </a:xfrm>
+                <a:prstGeom prst="rect">
+                  <a:avLst/>
+                </a:prstGeom>
+                <a:noFill/>
+              </p:spPr>
+              <p:txBody>
+                <a:bodyPr wrap="square" rtlCol="0">
+                  <a:spAutoFit/>
+                </a:bodyPr>
+                <a:lstStyle/>
+                <a:p>
+                  <a:r>
+                    <a:rPr lang="en-US" dirty="0" smtClean="0">
+                      <a:solidFill>
+                        <a:schemeClr val="bg1"/>
+                      </a:solidFill>
+                    </a:rPr>
+                    <a:t>RAW DATA</a:t>
+                  </a:r>
+                  <a:endParaRPr lang="en-US" dirty="0">
+                    <a:solidFill>
+                      <a:schemeClr val="bg1"/>
+                    </a:solidFill>
+                  </a:endParaRPr>
+                </a:p>
+              </p:txBody>
+            </p:sp>
+            <p:sp>
+              <p:nvSpPr>
+                <p:cNvPr id="37" name="TextBox 36"/>
+                <p:cNvSpPr txBox="1"/>
+                <p:nvPr/>
+              </p:nvSpPr>
+              <p:spPr>
+                <a:xfrm>
+                  <a:off x="2575602" y="458332"/>
+                  <a:ext cx="1585782" cy="646331"/>
+                </a:xfrm>
+                <a:prstGeom prst="rect">
+                  <a:avLst/>
+                </a:prstGeom>
+                <a:noFill/>
+              </p:spPr>
+              <p:txBody>
+                <a:bodyPr wrap="square" rtlCol="0">
+                  <a:spAutoFit/>
+                </a:bodyPr>
+                <a:lstStyle/>
+                <a:p>
+                  <a:r>
+                    <a:rPr lang="en-US" dirty="0" err="1" smtClean="0">
+                      <a:solidFill>
+                        <a:schemeClr val="bg1"/>
+                      </a:solidFill>
+                    </a:rPr>
+                    <a:t>Demultiplex</a:t>
+                  </a:r>
+                  <a:r>
+                    <a:rPr lang="en-US" dirty="0" smtClean="0">
+                      <a:solidFill>
+                        <a:schemeClr val="bg1"/>
+                      </a:solidFill>
+                    </a:rPr>
+                    <a:t> and filter</a:t>
+                  </a:r>
+                  <a:endParaRPr lang="en-US" dirty="0">
+                    <a:solidFill>
+                      <a:schemeClr val="bg1"/>
+                    </a:solidFill>
+                  </a:endParaRPr>
+                </a:p>
+              </p:txBody>
+            </p:sp>
+            <p:sp>
+              <p:nvSpPr>
+                <p:cNvPr id="38" name="Flowchart: Extract 37"/>
+                <p:cNvSpPr/>
+                <p:nvPr/>
+              </p:nvSpPr>
+              <p:spPr>
+                <a:xfrm rot="5400000">
+                  <a:off x="2466970" y="675873"/>
+                  <a:ext cx="276209" cy="235062"/>
+                </a:xfrm>
+                <a:prstGeom prst="flowChartExtract">
+                  <a:avLst/>
+                </a:prstGeom>
+                <a:ln>
+                  <a:solidFill>
+                    <a:schemeClr val="accent5">
+                      <a:lumMod val="75000"/>
+                    </a:schemeClr>
+                  </a:solidFill>
+                </a:ln>
+              </p:spPr>
+              <p:style>
+                <a:lnRef idx="2">
+                  <a:schemeClr val="accent5">
+                    <a:hueOff val="0"/>
+                    <a:satOff val="0"/>
+                    <a:lumOff val="0"/>
+                    <a:alphaOff val="0"/>
+                  </a:schemeClr>
+                </a:lnRef>
+                <a:fillRef idx="1">
+                  <a:schemeClr val="lt1">
+                    <a:hueOff val="0"/>
+                    <a:satOff val="0"/>
+                    <a:lumOff val="0"/>
+                    <a:alphaOff val="0"/>
+                  </a:schemeClr>
+                </a:fillRef>
+                <a:effectRef idx="0">
+                  <a:schemeClr val="lt1">
+                    <a:hueOff val="0"/>
+                    <a:satOff val="0"/>
+                    <a:lumOff val="0"/>
+                    <a:alphaOff val="0"/>
+                  </a:schemeClr>
+                </a:effectRef>
+                <a:fontRef idx="minor">
+                  <a:schemeClr val="dk1">
+                    <a:hueOff val="0"/>
+                    <a:satOff val="0"/>
+                    <a:lumOff val="0"/>
+                    <a:alphaOff val="0"/>
+                  </a:schemeClr>
+                </a:fontRef>
+              </p:style>
+            </p:sp>
+          </p:grpSp>
+        </p:grpSp>
+        <p:sp>
+          <p:nvSpPr>
+            <p:cNvPr id="53" name="Rectangle 52"/>
+            <p:cNvSpPr/>
+            <p:nvPr/>
+          </p:nvSpPr>
+          <p:spPr>
+            <a:xfrm>
+              <a:off x="4842440" y="2849491"/>
+              <a:ext cx="702190" cy="211511"/>
+            </a:xfrm>
+            <a:prstGeom prst="rect">
+              <a:avLst/>
+            </a:prstGeom>
+            <a:solidFill>
+              <a:schemeClr val="bg1"/>
+            </a:solidFill>
+            <a:ln>
+              <a:solidFill>
+                <a:srgbClr val="2F5597"/>
+              </a:solidFill>
+            </a:ln>
+          </p:spPr>
+          <p:style>
+            <a:lnRef idx="2">
+              <a:schemeClr val="accent1">
+                <a:shade val="50000"/>
+              </a:schemeClr>
+            </a:lnRef>
+            <a:fillRef idx="1">
+              <a:schemeClr val="accent1"/>
+            </a:fillRef>
+            <a:effectRef idx="0">
+              <a:schemeClr val="accent1"/>
+            </a:effectRef>
+            <a:fontRef idx="minor">
+              <a:schemeClr val="lt1"/>
+            </a:fontRef>
+          </p:style>
+          <p:txBody>
+            <a:bodyPr rtlCol="0" anchor="ctr"/>
+            <a:lstStyle/>
+            <a:p>
+              <a:pPr algn="ctr"/>
+              <a:endParaRPr lang="en-US"/>
+            </a:p>
+          </p:txBody>
+        </p:sp>
+        <p:sp>
+          <p:nvSpPr>
+            <p:cNvPr id="54" name="Down Arrow 53"/>
+            <p:cNvSpPr/>
+            <p:nvPr/>
+          </p:nvSpPr>
+          <p:spPr>
+            <a:xfrm rot="10800000">
+              <a:off x="5236654" y="2344067"/>
+              <a:ext cx="411892" cy="720482"/>
+            </a:xfrm>
+            <a:prstGeom prst="downArrow">
+              <a:avLst/>
+            </a:prstGeom>
+            <a:solidFill>
+              <a:schemeClr val="bg1"/>
+            </a:solidFill>
+            <a:ln>
+              <a:solidFill>
+                <a:srgbClr val="2F5597"/>
+              </a:solidFill>
+            </a:ln>
+          </p:spPr>
+          <p:style>
+            <a:lnRef idx="2">
+              <a:schemeClr val="accent1">
+                <a:shade val="50000"/>
+              </a:schemeClr>
+            </a:lnRef>
+            <a:fillRef idx="1">
+              <a:schemeClr val="accent1"/>
+            </a:fillRef>
+            <a:effectRef idx="0">
+              <a:schemeClr val="accent1"/>
+            </a:effectRef>
+            <a:fontRef idx="minor">
+              <a:schemeClr val="lt1"/>
+            </a:fontRef>
+          </p:style>
+          <p:txBody>
+            <a:bodyPr rtlCol="0" anchor="ctr"/>
+            <a:lstStyle/>
+            <a:p>
+              <a:pPr algn="ctr"/>
+              <a:endParaRPr lang="en-US"/>
+            </a:p>
+          </p:txBody>
+        </p:sp>
+      </p:grpSp>
+    </p:spTree>
+    <p:extLst>
+      <p:ext uri="{BB962C8B-B14F-4D97-AF65-F5344CB8AC3E}">
+        <p14:creationId xmlns:p14="http://schemas.microsoft.com/office/powerpoint/2010/main" val="2479312931"/>
+      </p:ext>
+    </p:extLst>
+  </p:cSld>
+  <p:clrMapOvr>
+    <a:masterClrMapping/>
+  </p:clrMapOvr>
+</p:sld>
+</file>
+
 <file path=ppt/theme/theme1.xml><?xml version="1.0" encoding="utf-8"?>
 <a:theme xmlns:a="http://schemas.openxmlformats.org/drawingml/2006/main" name="Office Theme">
   <a:themeElements>

</xml_diff>